<commit_message>
Finished Class 13 notes
</commit_message>
<xml_diff>
--- a/slides/Unit 2 - LC 101 - Class 13.pptx
+++ b/slides/Unit 2 - LC 101 - Class 13.pptx
@@ -254,6 +254,11 @@
       </a:defRPr>
     </a:lvl9pPr>
   </p:defaultTextStyle>
+  <p:extLst>
+    <p:ext uri="{EFAFB233-063F-42B5-8137-9DF3F51BA10A}">
+      <p15:sldGuideLst xmlns:p15="http://schemas.microsoft.com/office/powerpoint/2012/main"/>
+    </p:ext>
+  </p:extLst>
 </p:presentation>
 </file>
 
@@ -8157,44 +8162,8 @@
                   <a:srgbClr val="FFFFFF"/>
                 </a:solidFill>
               </a:rPr>
-              <a:t>Documentation</a:t>
+              <a:t>FYI: This is in Saturday’s class prep, so don’t freak out yet. </a:t>
             </a:r>
-            <a:endParaRPr sz="2400" dirty="0">
-              <a:solidFill>
-                <a:srgbClr val="FFFFFF"/>
-              </a:solidFill>
-            </a:endParaRPr>
-          </a:p>
-          <a:p>
-            <a:pPr marL="457200" lvl="0" indent="-381000" rtl="0">
-              <a:lnSpc>
-                <a:spcPct val="115000"/>
-              </a:lnSpc>
-              <a:spcBef>
-                <a:spcPts val="1000"/>
-              </a:spcBef>
-              <a:spcAft>
-                <a:spcPts val="0"/>
-              </a:spcAft>
-              <a:buClr>
-                <a:srgbClr val="FFFFFF"/>
-              </a:buClr>
-              <a:buSzPts val="2400"/>
-              <a:buChar char="●"/>
-            </a:pPr>
-            <a:r>
-              <a:rPr lang="en" sz="2400" dirty="0">
-                <a:solidFill>
-                  <a:srgbClr val="FFFFFF"/>
-                </a:solidFill>
-              </a:rPr>
-              <a:t>Examples</a:t>
-            </a:r>
-            <a:endParaRPr sz="2400" dirty="0">
-              <a:solidFill>
-                <a:srgbClr val="FFFFFF"/>
-              </a:solidFill>
-            </a:endParaRPr>
           </a:p>
         </p:txBody>
       </p:sp>
@@ -8516,67 +8485,6 @@
                       </p:childTnLst>
                     </p:cTn>
                   </p:par>
-                  <p:par>
-                    <p:cTn id="28" fill="hold">
-                      <p:stCondLst>
-                        <p:cond delay="indefinite"/>
-                      </p:stCondLst>
-                      <p:childTnLst>
-                        <p:par>
-                          <p:cTn id="29" fill="hold">
-                            <p:stCondLst>
-                              <p:cond delay="0"/>
-                            </p:stCondLst>
-                            <p:childTnLst>
-                              <p:par>
-                                <p:cTn id="30" presetID="10" presetClass="entr" presetSubtype="0" fill="hold" nodeType="clickEffect">
-                                  <p:stCondLst>
-                                    <p:cond delay="0"/>
-                                  </p:stCondLst>
-                                  <p:childTnLst>
-                                    <p:set>
-                                      <p:cBhvr>
-                                        <p:cTn id="31" dur="1" fill="hold">
-                                          <p:stCondLst>
-                                            <p:cond delay="0"/>
-                                          </p:stCondLst>
-                                        </p:cTn>
-                                        <p:tgtEl>
-                                          <p:spTgt spid="104">
-                                            <p:txEl>
-                                              <p:pRg st="5" end="5"/>
-                                            </p:txEl>
-                                          </p:spTgt>
-                                        </p:tgtEl>
-                                        <p:attrNameLst>
-                                          <p:attrName>style.visibility</p:attrName>
-                                        </p:attrNameLst>
-                                      </p:cBhvr>
-                                      <p:to>
-                                        <p:strVal val="visible"/>
-                                      </p:to>
-                                    </p:set>
-                                    <p:animEffect transition="in" filter="fade">
-                                      <p:cBhvr>
-                                        <p:cTn id="32" dur="1000"/>
-                                        <p:tgtEl>
-                                          <p:spTgt spid="104">
-                                            <p:txEl>
-                                              <p:pRg st="5" end="5"/>
-                                            </p:txEl>
-                                          </p:spTgt>
-                                        </p:tgtEl>
-                                      </p:cBhvr>
-                                    </p:animEffect>
-                                  </p:childTnLst>
-                                </p:cTn>
-                              </p:par>
-                            </p:childTnLst>
-                          </p:cTn>
-                        </p:par>
-                      </p:childTnLst>
-                    </p:cTn>
-                  </p:par>
                 </p:childTnLst>
               </p:cTn>
               <p:prevCondLst>
@@ -8703,14 +8611,14 @@
               <a:buChar char="●"/>
             </a:pPr>
             <a:r>
-              <a:rPr lang="en" sz="2400">
+              <a:rPr lang="en" sz="2400" dirty="0">
                 <a:solidFill>
                   <a:srgbClr val="FFFFFF"/>
                 </a:solidFill>
               </a:rPr>
               <a:t>Download the CSS files -OR-</a:t>
             </a:r>
-            <a:endParaRPr sz="2400">
+            <a:endParaRPr sz="2400" dirty="0">
               <a:solidFill>
                 <a:srgbClr val="FFFFFF"/>
               </a:solidFill>
@@ -8734,7 +8642,7 @@
               <a:buChar char="●"/>
             </a:pPr>
             <a:r>
-              <a:rPr lang="en" sz="2400">
+              <a:rPr lang="en" sz="2400" dirty="0">
                 <a:solidFill>
                   <a:srgbClr val="FFFFFF"/>
                 </a:solidFill>
@@ -8742,14 +8650,14 @@
               <a:t>You can link to their files on a CDN </a:t>
             </a:r>
             <a:r>
-              <a:rPr lang="en" sz="2000">
+              <a:rPr lang="en" sz="2000" dirty="0">
                 <a:solidFill>
                   <a:srgbClr val="FFFFFF"/>
                 </a:solidFill>
               </a:rPr>
               <a:t>(Content Delivery Network)</a:t>
             </a:r>
-            <a:endParaRPr sz="2000">
+            <a:endParaRPr sz="2000" dirty="0">
               <a:solidFill>
                 <a:srgbClr val="FFFFFF"/>
               </a:solidFill>
@@ -8773,14 +8681,14 @@
               <a:buChar char="○"/>
             </a:pPr>
             <a:r>
-              <a:rPr lang="en" sz="2400">
+              <a:rPr lang="en" sz="2400" dirty="0">
                 <a:solidFill>
                   <a:srgbClr val="FFFFFF"/>
                 </a:solidFill>
               </a:rPr>
               <a:t>That is simply a server that serves up things like images and css files</a:t>
             </a:r>
-            <a:endParaRPr sz="2400">
+            <a:endParaRPr sz="2400" dirty="0">
               <a:solidFill>
                 <a:srgbClr val="FFFFFF"/>
               </a:solidFill>
@@ -8804,14 +8712,14 @@
               <a:buChar char="●"/>
             </a:pPr>
             <a:r>
-              <a:rPr lang="en" sz="2400">
+              <a:rPr lang="en" sz="2400" dirty="0">
                 <a:solidFill>
                   <a:srgbClr val="FFFFFF"/>
                 </a:solidFill>
               </a:rPr>
               <a:t>Read the docs!!!</a:t>
             </a:r>
-            <a:endParaRPr sz="2400">
+            <a:endParaRPr sz="2400" dirty="0">
               <a:solidFill>
                 <a:srgbClr val="FFFFFF"/>
               </a:solidFill>
@@ -8835,14 +8743,14 @@
               <a:buChar char="●"/>
             </a:pPr>
             <a:r>
-              <a:rPr lang="en" sz="2400">
+              <a:rPr lang="en" sz="2400" dirty="0">
                 <a:solidFill>
                   <a:srgbClr val="FFFFFF"/>
                 </a:solidFill>
               </a:rPr>
               <a:t>Add the &lt;link&gt; to your .html file</a:t>
             </a:r>
-            <a:endParaRPr sz="2400">
+            <a:endParaRPr sz="2400" dirty="0">
               <a:solidFill>
                 <a:srgbClr val="FFFFFF"/>
               </a:solidFill>
@@ -8866,14 +8774,14 @@
               <a:buChar char="●"/>
             </a:pPr>
             <a:r>
-              <a:rPr lang="en" sz="2400">
+              <a:rPr lang="en" sz="2400" dirty="0">
                 <a:solidFill>
                   <a:srgbClr val="FFFFFF"/>
                 </a:solidFill>
               </a:rPr>
               <a:t>Start using it!</a:t>
             </a:r>
-            <a:endParaRPr sz="2400">
+            <a:endParaRPr sz="2400" dirty="0">
               <a:solidFill>
                 <a:srgbClr val="FFFFFF"/>
               </a:solidFill>

</xml_diff>